<commit_message>
ajout etude thèse Valérie Ficet 1999
</commit_message>
<xml_diff>
--- a/Travail realise/Présentations/Utilisation du RàPC pour la segmentation d’images.pptx
+++ b/Travail realise/Présentations/Utilisation du RàPC pour la segmentation d’images.pptx
@@ -221,7 +221,7 @@
           <a:p>
             <a:fld id="{3BF17BC6-DB60-45E7-9D02-F2D1FB25D0FA}" type="datetimeFigureOut">
               <a:rPr lang="fr-FR" smtClean="0"/>
-              <a:t>15/03/2017</a:t>
+              <a:t>17/03/2017</a:t>
             </a:fld>
             <a:endParaRPr lang="fr-FR"/>
           </a:p>
@@ -897,7 +897,33 @@
           <a:bodyPr/>
           <a:lstStyle/>
           <a:p>
-            <a:endParaRPr lang="fr-FR"/>
+            <a:r>
+              <a:rPr lang="fr-FR" dirty="0" smtClean="0"/>
+              <a:t>Parler aussi du problème si une des données (par exemple : le nombre de coupes)</a:t>
+            </a:r>
+            <a:r>
+              <a:rPr lang="fr-FR" baseline="0" dirty="0" smtClean="0"/>
+              <a:t> est manquante, comment faire ?</a:t>
+            </a:r>
+          </a:p>
+          <a:p>
+            <a:r>
+              <a:rPr lang="fr-FR" baseline="0" dirty="0" smtClean="0"/>
+              <a:t>	</a:t>
+            </a:r>
+            <a:r>
+              <a:rPr lang="fr-FR" baseline="0" dirty="0" smtClean="0">
+                <a:sym typeface="Wingdings" panose="05000000000000000000" pitchFamily="2" charset="2"/>
+              </a:rPr>
+              <a:t> pour le calcul </a:t>
+            </a:r>
+            <a:r>
+              <a:rPr lang="fr-FR" baseline="0" smtClean="0">
+                <a:sym typeface="Wingdings" panose="05000000000000000000" pitchFamily="2" charset="2"/>
+              </a:rPr>
+              <a:t>de similarité</a:t>
+            </a:r>
+            <a:endParaRPr lang="fr-FR" dirty="0"/>
           </a:p>
         </p:txBody>
       </p:sp>
@@ -1466,11 +1492,7 @@
           <a:p>
             <a:r>
               <a:rPr lang="fr-FR" dirty="0" smtClean="0"/>
-              <a:t>Nécessite un prétraitement pour calculer toutes ces grandeurs</a:t>
-            </a:r>
-            <a:r>
-              <a:rPr lang="fr-FR" dirty="0" smtClean="0"/>
-              <a:t>.</a:t>
+              <a:t>Nécessite un prétraitement pour calculer toutes ces grandeurs.</a:t>
             </a:r>
           </a:p>
           <a:p>
@@ -1925,11 +1947,7 @@
           <a:p>
             <a:r>
               <a:rPr lang="fr-FR" baseline="0" dirty="0" smtClean="0"/>
-              <a:t>Par exemple à d = 0,007 ici</a:t>
-            </a:r>
-            <a:r>
-              <a:rPr lang="fr-FR" baseline="0" dirty="0" smtClean="0"/>
-              <a:t>.</a:t>
+              <a:t>Par exemple à d = 0,007 ici.</a:t>
             </a:r>
           </a:p>
           <a:p>
@@ -2577,7 +2595,7 @@
           <a:p>
             <a:fld id="{B13A3E0C-43BD-4BD3-9D98-E47133C0F16B}" type="datetime1">
               <a:rPr lang="en-US" smtClean="0"/>
-              <a:t>3/15/2017</a:t>
+              <a:t>3/17/2017</a:t>
             </a:fld>
             <a:endParaRPr lang="en-US" dirty="0"/>
           </a:p>
@@ -2873,7 +2891,7 @@
           <a:p>
             <a:fld id="{DEAE60AC-6FB4-4151-AF18-32B957CEA5B2}" type="datetime1">
               <a:rPr lang="en-US" smtClean="0"/>
-              <a:t>3/15/2017</a:t>
+              <a:t>3/17/2017</a:t>
             </a:fld>
             <a:endParaRPr lang="en-US" dirty="0"/>
           </a:p>
@@ -3121,7 +3139,7 @@
           <a:p>
             <a:fld id="{49AF46AD-D75C-4BBC-B0EE-EB1C4A750FFF}" type="datetime1">
               <a:rPr lang="en-US" smtClean="0"/>
-              <a:t>3/15/2017</a:t>
+              <a:t>3/17/2017</a:t>
             </a:fld>
             <a:endParaRPr lang="en-US" dirty="0"/>
           </a:p>
@@ -3661,7 +3679,7 @@
           <a:p>
             <a:fld id="{B3EBDC74-5C10-4051-A6E3-AA9EF5D2777A}" type="datetime1">
               <a:rPr lang="en-US" smtClean="0"/>
-              <a:t>3/15/2017</a:t>
+              <a:t>3/17/2017</a:t>
             </a:fld>
             <a:endParaRPr lang="en-US" dirty="0"/>
           </a:p>
@@ -3909,7 +3927,7 @@
           <a:p>
             <a:fld id="{A45DC689-383C-4C65-9A99-BE249E8E6DA6}" type="datetime1">
               <a:rPr lang="en-US" smtClean="0"/>
-              <a:t>3/15/2017</a:t>
+              <a:t>3/17/2017</a:t>
             </a:fld>
             <a:endParaRPr lang="en-US" dirty="0"/>
           </a:p>
@@ -4441,7 +4459,7 @@
           <a:p>
             <a:fld id="{CD908F51-167A-4815-AAA7-25CFFE4B423B}" type="datetime1">
               <a:rPr lang="en-US" smtClean="0"/>
-              <a:t>3/15/2017</a:t>
+              <a:t>3/17/2017</a:t>
             </a:fld>
             <a:endParaRPr lang="en-US" dirty="0"/>
           </a:p>
@@ -4738,7 +4756,7 @@
           <a:p>
             <a:fld id="{575B863B-5F62-4D1B-A811-2497203129B2}" type="datetime1">
               <a:rPr lang="en-US" smtClean="0"/>
-              <a:t>3/15/2017</a:t>
+              <a:t>3/17/2017</a:t>
             </a:fld>
             <a:endParaRPr lang="en-US" dirty="0"/>
           </a:p>
@@ -4912,7 +4930,7 @@
           <a:p>
             <a:fld id="{2C9DBC4B-3B74-49C1-839E-BABE36E5940B}" type="datetime1">
               <a:rPr lang="en-US" smtClean="0"/>
-              <a:t>3/15/2017</a:t>
+              <a:t>3/17/2017</a:t>
             </a:fld>
             <a:endParaRPr lang="en-US" dirty="0"/>
           </a:p>
@@ -5092,7 +5110,7 @@
           <a:p>
             <a:fld id="{F235FBA5-93E2-443B-A8CE-27C1480288D2}" type="datetime1">
               <a:rPr lang="en-US" smtClean="0"/>
-              <a:t>3/15/2017</a:t>
+              <a:t>3/17/2017</a:t>
             </a:fld>
             <a:endParaRPr lang="en-US" dirty="0"/>
           </a:p>
@@ -5262,7 +5280,7 @@
           <a:p>
             <a:fld id="{41689828-3518-4A8E-AE0E-F7C6B57D9567}" type="datetime1">
               <a:rPr lang="en-US" smtClean="0"/>
-              <a:t>3/15/2017</a:t>
+              <a:t>3/17/2017</a:t>
             </a:fld>
             <a:endParaRPr lang="en-US" dirty="0"/>
           </a:p>
@@ -5513,7 +5531,7 @@
           <a:p>
             <a:fld id="{8049D5B7-E950-4F1F-896A-2428B09F2CC0}" type="datetime1">
               <a:rPr lang="en-US" smtClean="0"/>
-              <a:t>3/15/2017</a:t>
+              <a:t>3/17/2017</a:t>
             </a:fld>
             <a:endParaRPr lang="en-US" dirty="0"/>
           </a:p>
@@ -5810,7 +5828,7 @@
           <a:p>
             <a:fld id="{933C9C39-ED98-4B12-9750-FA3EA5E008D8}" type="datetime1">
               <a:rPr lang="en-US" smtClean="0"/>
-              <a:t>3/15/2017</a:t>
+              <a:t>3/17/2017</a:t>
             </a:fld>
             <a:endParaRPr lang="en-US" dirty="0"/>
           </a:p>
@@ -6252,7 +6270,7 @@
           <a:p>
             <a:fld id="{E9232F9C-7B0D-40AC-879E-D399781AA9DD}" type="datetime1">
               <a:rPr lang="en-US" smtClean="0"/>
-              <a:t>3/15/2017</a:t>
+              <a:t>3/17/2017</a:t>
             </a:fld>
             <a:endParaRPr lang="en-US" dirty="0"/>
           </a:p>
@@ -6370,7 +6388,7 @@
           <a:p>
             <a:fld id="{50646EB0-DC39-4154-9CE8-BEB693E1778F}" type="datetime1">
               <a:rPr lang="en-US" smtClean="0"/>
-              <a:t>3/15/2017</a:t>
+              <a:t>3/17/2017</a:t>
             </a:fld>
             <a:endParaRPr lang="en-US" dirty="0"/>
           </a:p>
@@ -6465,7 +6483,7 @@
           <a:p>
             <a:fld id="{1862B018-388A-4D00-857F-89E0E298EDB9}" type="datetime1">
               <a:rPr lang="en-US" smtClean="0"/>
-              <a:t>3/15/2017</a:t>
+              <a:t>3/17/2017</a:t>
             </a:fld>
             <a:endParaRPr lang="en-US" dirty="0"/>
           </a:p>
@@ -6748,7 +6766,7 @@
           <a:p>
             <a:fld id="{5876601C-147A-40D7-86CA-8C540E946C34}" type="datetime1">
               <a:rPr lang="en-US" smtClean="0"/>
-              <a:t>3/15/2017</a:t>
+              <a:t>3/17/2017</a:t>
             </a:fld>
             <a:endParaRPr lang="en-US" dirty="0"/>
           </a:p>
@@ -7039,7 +7057,7 @@
           <a:p>
             <a:fld id="{B25ACF09-D22D-44AC-9A23-30C84696D0B5}" type="datetime1">
               <a:rPr lang="en-US" smtClean="0"/>
-              <a:t>3/15/2017</a:t>
+              <a:t>3/17/2017</a:t>
             </a:fld>
             <a:endParaRPr lang="en-US" dirty="0"/>
           </a:p>
@@ -7569,7 +7587,7 @@
           <a:p>
             <a:fld id="{ED468347-93DD-4B15-A18F-1C554DAB4580}" type="datetime1">
               <a:rPr lang="en-US" smtClean="0"/>
-              <a:t>3/15/2017</a:t>
+              <a:t>3/17/2017</a:t>
             </a:fld>
             <a:endParaRPr lang="en-US" dirty="0"/>
           </a:p>
@@ -9341,11 +9359,7 @@
             <a:pPr lvl="1"/>
             <a:r>
               <a:rPr lang="fr-FR" dirty="0" smtClean="0"/>
-              <a:t>Comparaison dans les clusters obtenus de la proximité des valeurs des solutions </a:t>
-            </a:r>
-            <a:r>
-              <a:rPr lang="fr-FR" dirty="0" smtClean="0"/>
-              <a:t>associées</a:t>
+              <a:t>Comparaison dans les clusters obtenus de la proximité des valeurs des solutions associées</a:t>
             </a:r>
             <a:endParaRPr lang="fr-FR" dirty="0"/>
           </a:p>
@@ -10025,34 +10039,20 @@
               <a:rPr lang="fr-FR" dirty="0" smtClean="0"/>
               <a:t>Plusieurs pistes concernant la modélisation des cas:</a:t>
             </a:r>
-            <a:endParaRPr lang="fr-FR" dirty="0" smtClean="0"/>
           </a:p>
           <a:p>
             <a:pPr lvl="1"/>
             <a:r>
               <a:rPr lang="fr-FR" dirty="0" smtClean="0"/>
-              <a:t>Des entiers / réels </a:t>
-            </a:r>
-            <a:r>
-              <a:rPr lang="fr-FR" dirty="0" smtClean="0"/>
-              <a:t>uniquement (ex</a:t>
-            </a:r>
-            <a:r>
-              <a:rPr lang="fr-FR" dirty="0" smtClean="0"/>
-              <a:t>: sexe = {0,1} pour {Homme, Femme})</a:t>
+              <a:t>Des entiers / réels uniquement (ex: sexe = {0,1} pour {Homme, Femme})</a:t>
             </a:r>
           </a:p>
           <a:p>
             <a:pPr lvl="1"/>
             <a:r>
               <a:rPr lang="fr-FR" dirty="0" smtClean="0"/>
-              <a:t>Normalisation </a:t>
-            </a:r>
-            <a:r>
-              <a:rPr lang="fr-FR" dirty="0" smtClean="0"/>
-              <a:t>? </a:t>
-            </a:r>
-            <a:endParaRPr lang="fr-FR" dirty="0" smtClean="0"/>
+              <a:t>Normalisation ? </a:t>
+            </a:r>
           </a:p>
           <a:p>
             <a:pPr lvl="1"/>
@@ -11334,13 +11334,8 @@
             </a:pPr>
             <a:r>
               <a:rPr lang="fr-FR" dirty="0" smtClean="0"/>
-              <a:t>La </a:t>
-            </a:r>
-            <a:r>
-              <a:rPr lang="fr-FR" dirty="0" smtClean="0"/>
-              <a:t>base de cas : </a:t>
-            </a:r>
-            <a:endParaRPr lang="fr-FR" dirty="0" smtClean="0"/>
+              <a:t>La base de cas : </a:t>
+            </a:r>
           </a:p>
           <a:p>
             <a:pPr marL="0" indent="0">
@@ -11373,11 +11368,7 @@
             <a:pPr lvl="2"/>
             <a:r>
               <a:rPr lang="fr-FR" dirty="0" smtClean="0"/>
-              <a:t>Hiérarchiser, Organiser, Trier, etc.</a:t>
-            </a:r>
-            <a:r>
-              <a:rPr lang="fr-FR" dirty="0" smtClean="0"/>
-              <a:t> </a:t>
+              <a:t>Hiérarchiser, Organiser, Trier, etc. </a:t>
             </a:r>
             <a:r>
               <a:rPr lang="fr-FR" dirty="0" smtClean="0">
@@ -12097,13 +12088,8 @@
             </a:pPr>
             <a:r>
               <a:rPr lang="fr-FR" dirty="0" smtClean="0"/>
-              <a:t>La </a:t>
-            </a:r>
-            <a:r>
-              <a:rPr lang="fr-FR" dirty="0" smtClean="0"/>
-              <a:t>base de cas : </a:t>
-            </a:r>
-            <a:endParaRPr lang="fr-FR" dirty="0" smtClean="0"/>
+              <a:t>La base de cas : </a:t>
+            </a:r>
           </a:p>
           <a:p>
             <a:pPr marL="0" indent="0">
@@ -12367,7 +12353,6 @@
               <a:rPr lang="fr-FR" dirty="0" smtClean="0"/>
               <a:t> :</a:t>
             </a:r>
-            <a:endParaRPr lang="fr-FR" dirty="0" smtClean="0"/>
           </a:p>
           <a:p>
             <a:pPr marL="0" indent="0">
@@ -12662,11 +12647,7 @@
             </a:pPr>
             <a:r>
               <a:rPr lang="fr-FR" dirty="0" smtClean="0"/>
-              <a:t>Digramme de classe simplifi</a:t>
-            </a:r>
-            <a:r>
-              <a:rPr lang="fr-FR" dirty="0" smtClean="0"/>
-              <a:t>é en utilisant </a:t>
+              <a:t>Digramme de classe simplifié en utilisant </a:t>
             </a:r>
             <a:r>
               <a:rPr lang="fr-FR" dirty="0"/>
@@ -12676,7 +12657,6 @@
               <a:rPr lang="fr-FR" dirty="0" smtClean="0"/>
               <a:t>es classes de cas</a:t>
             </a:r>
-            <a:endParaRPr lang="fr-FR" dirty="0" smtClean="0"/>
           </a:p>
           <a:p>
             <a:pPr marL="0" indent="0">
@@ -13487,11 +13467,7 @@
             </a:pPr>
             <a:r>
               <a:rPr lang="fr-FR" dirty="0" smtClean="0"/>
-              <a:t>Exemple </a:t>
-            </a:r>
-            <a:r>
-              <a:rPr lang="fr-FR" dirty="0" smtClean="0"/>
-              <a:t>: Problème = composition tarte aux pommes </a:t>
+              <a:t>Exemple : Problème = composition tarte aux pommes </a:t>
             </a:r>
           </a:p>
           <a:p>
@@ -13504,23 +13480,7 @@
             </a:r>
             <a:r>
               <a:rPr lang="fr-FR" dirty="0" smtClean="0"/>
-              <a:t>	       Solution = 3pommes, </a:t>
-            </a:r>
-            <a:r>
-              <a:rPr lang="fr-FR" dirty="0" smtClean="0"/>
-              <a:t>100g de sucre</a:t>
-            </a:r>
-            <a:r>
-              <a:rPr lang="fr-FR" dirty="0" smtClean="0"/>
-              <a:t>, </a:t>
-            </a:r>
-            <a:r>
-              <a:rPr lang="fr-FR" dirty="0" smtClean="0"/>
-              <a:t>etc</a:t>
-            </a:r>
-            <a:r>
-              <a:rPr lang="fr-FR" dirty="0" smtClean="0"/>
-              <a:t>.</a:t>
+              <a:t>	       Solution = 3pommes, 100g de sucre, etc.</a:t>
             </a:r>
             <a:endParaRPr lang="fr-FR" dirty="0"/>
           </a:p>
@@ -13661,11 +13621,7 @@
             <a:pPr lvl="1"/>
             <a:r>
               <a:rPr lang="fr-FR" sz="2200" dirty="0" smtClean="0"/>
-              <a:t>Solution = position des germes + </a:t>
-            </a:r>
-            <a:r>
-              <a:rPr lang="fr-FR" sz="2200" dirty="0" smtClean="0"/>
-              <a:t>seuils</a:t>
+              <a:t>Solution = position des germes + seuils</a:t>
             </a:r>
           </a:p>
           <a:p>

</xml_diff>

<commit_message>
maj powerpoint presentation 1
</commit_message>
<xml_diff>
--- a/Travail realise/Présentations/Utilisation du RàPC pour la segmentation d’images.pptx
+++ b/Travail realise/Présentations/Utilisation du RàPC pour la segmentation d’images.pptx
@@ -915,13 +915,7 @@
               <a:rPr lang="fr-FR" baseline="0" dirty="0" smtClean="0">
                 <a:sym typeface="Wingdings" panose="05000000000000000000" pitchFamily="2" charset="2"/>
               </a:rPr>
-              <a:t> pour le calcul </a:t>
-            </a:r>
-            <a:r>
-              <a:rPr lang="fr-FR" baseline="0" smtClean="0">
-                <a:sym typeface="Wingdings" panose="05000000000000000000" pitchFamily="2" charset="2"/>
-              </a:rPr>
-              <a:t>de similarité</a:t>
+              <a:t> pour le calcul de similarité</a:t>
             </a:r>
             <a:endParaRPr lang="fr-FR" dirty="0"/>
           </a:p>
@@ -10794,7 +10788,13 @@
               <a:buAutoNum type="romanUcPeriod"/>
             </a:pPr>
             <a:r>
-              <a:rPr lang="fr-FR" dirty="0" smtClean="0"/>
+              <a:rPr lang="fr-FR" dirty="0" smtClean="0">
+                <a:solidFill>
+                  <a:schemeClr val="bg2">
+                    <a:lumMod val="75000"/>
+                  </a:schemeClr>
+                </a:solidFill>
+              </a:rPr>
               <a:t>Mesure de Similarité</a:t>
             </a:r>
           </a:p>
@@ -10803,7 +10803,13 @@
               <a:buSzPct val="120000"/>
             </a:pPr>
             <a:r>
-              <a:rPr lang="fr-FR" dirty="0" smtClean="0"/>
+              <a:rPr lang="fr-FR" dirty="0" smtClean="0">
+                <a:solidFill>
+                  <a:schemeClr val="bg2">
+                    <a:lumMod val="75000"/>
+                  </a:schemeClr>
+                </a:solidFill>
+              </a:rPr>
               <a:t>Etat de l’art</a:t>
             </a:r>
           </a:p>
@@ -10812,7 +10818,13 @@
               <a:buSzPct val="120000"/>
             </a:pPr>
             <a:r>
-              <a:rPr lang="fr-FR" dirty="0" smtClean="0"/>
+              <a:rPr lang="fr-FR" dirty="0" smtClean="0">
+                <a:solidFill>
+                  <a:schemeClr val="bg2">
+                    <a:lumMod val="75000"/>
+                  </a:schemeClr>
+                </a:solidFill>
+              </a:rPr>
               <a:t>Dans notre cas d’étude</a:t>
             </a:r>
           </a:p>
@@ -13224,64 +13236,137 @@
         <p:spPr>
           <a:xfrm>
             <a:off x="1484310" y="1810656"/>
-            <a:ext cx="10593390" cy="3632201"/>
+            <a:ext cx="10593390" cy="4056475"/>
           </a:xfrm>
         </p:spPr>
         <p:txBody>
           <a:bodyPr anchor="t">
-            <a:normAutofit/>
+            <a:noAutofit/>
           </a:bodyPr>
           <a:lstStyle/>
           <a:p>
             <a:pPr marL="0" indent="0">
               <a:buNone/>
             </a:pPr>
-            <a:endParaRPr lang="fr-FR" dirty="0" smtClean="0"/>
+            <a:r>
+              <a:rPr lang="fr-FR" sz="2200" dirty="0" smtClean="0"/>
+              <a:t>Idée </a:t>
+            </a:r>
+            <a:r>
+              <a:rPr lang="fr-FR" sz="2200" dirty="0" smtClean="0"/>
+              <a:t>: à partir d’un scanner </a:t>
+            </a:r>
+            <a:r>
+              <a:rPr lang="fr-FR" sz="2200" dirty="0" smtClean="0"/>
+              <a:t>donné,</a:t>
+            </a:r>
           </a:p>
           <a:p>
             <a:pPr marL="0" indent="0">
               <a:buNone/>
             </a:pPr>
             <a:r>
-              <a:rPr lang="fr-FR" dirty="0" smtClean="0"/>
-              <a:t>Idée : à partir d’un scanner donné, déterminer la position optimale des pixels germes (+seuils) en vue d’une segmentation par croissance de régions.</a:t>
-            </a:r>
+              <a:rPr lang="fr-FR" sz="2200" dirty="0" smtClean="0"/>
+              <a:t> </a:t>
+            </a:r>
+            <a:r>
+              <a:rPr lang="fr-FR" sz="2200" dirty="0" smtClean="0"/>
+              <a:t>déterminer la position optimale des </a:t>
+            </a:r>
+            <a:endParaRPr lang="fr-FR" sz="2200" dirty="0" smtClean="0"/>
           </a:p>
           <a:p>
             <a:pPr marL="0" indent="0">
               <a:buNone/>
             </a:pPr>
-            <a:endParaRPr lang="fr-FR" dirty="0"/>
+            <a:r>
+              <a:rPr lang="fr-FR" sz="2200" dirty="0" smtClean="0"/>
+              <a:t>pixels </a:t>
+            </a:r>
+            <a:r>
+              <a:rPr lang="fr-FR" sz="2200" dirty="0" smtClean="0"/>
+              <a:t>germes (+seuils) </a:t>
+            </a:r>
+            <a:endParaRPr lang="fr-FR" sz="2200" dirty="0" smtClean="0"/>
           </a:p>
           <a:p>
             <a:pPr marL="0" indent="0">
               <a:buNone/>
             </a:pPr>
             <a:r>
-              <a:rPr lang="fr-FR" dirty="0" smtClean="0">
+              <a:rPr lang="fr-FR" sz="2200" dirty="0" smtClean="0"/>
+              <a:t>en </a:t>
+            </a:r>
+            <a:r>
+              <a:rPr lang="fr-FR" sz="2200" dirty="0" smtClean="0"/>
+              <a:t>vue d’une segmentation </a:t>
+            </a:r>
+            <a:endParaRPr lang="fr-FR" sz="2200" dirty="0" smtClean="0"/>
+          </a:p>
+          <a:p>
+            <a:pPr marL="0" indent="0">
+              <a:buNone/>
+            </a:pPr>
+            <a:r>
+              <a:rPr lang="fr-FR" sz="2200" dirty="0" smtClean="0"/>
+              <a:t>par </a:t>
+            </a:r>
+            <a:r>
+              <a:rPr lang="fr-FR" sz="2200" dirty="0" smtClean="0"/>
+              <a:t>croissance de régions.</a:t>
+            </a:r>
+          </a:p>
+          <a:p>
+            <a:pPr marL="0" indent="0">
+              <a:buNone/>
+            </a:pPr>
+            <a:endParaRPr lang="fr-FR" sz="2200" dirty="0" smtClean="0">
+              <a:sym typeface="Wingdings" panose="05000000000000000000" pitchFamily="2" charset="2"/>
+            </a:endParaRPr>
+          </a:p>
+          <a:p>
+            <a:pPr marL="0" indent="0">
+              <a:buNone/>
+            </a:pPr>
+            <a:endParaRPr lang="fr-FR" sz="2200" dirty="0">
+              <a:sym typeface="Wingdings" panose="05000000000000000000" pitchFamily="2" charset="2"/>
+            </a:endParaRPr>
+          </a:p>
+          <a:p>
+            <a:pPr marL="0" indent="0">
+              <a:buNone/>
+            </a:pPr>
+            <a:r>
+              <a:rPr lang="fr-FR" sz="2200" dirty="0" smtClean="0">
                 <a:sym typeface="Wingdings" panose="05000000000000000000" pitchFamily="2" charset="2"/>
               </a:rPr>
-              <a:t>Scanner + informations (« image » / « nonimage »)   positions des germes + seuils</a:t>
-            </a:r>
-            <a:endParaRPr lang="fr-FR" dirty="0" smtClean="0"/>
+              <a:t>Scanner </a:t>
+            </a:r>
+            <a:r>
+              <a:rPr lang="fr-FR" sz="2200" dirty="0" smtClean="0">
+                <a:sym typeface="Wingdings" panose="05000000000000000000" pitchFamily="2" charset="2"/>
+              </a:rPr>
+              <a:t>+ informations (« image » / « nonimage »)   positions des germes + seuils</a:t>
+            </a:r>
+            <a:endParaRPr lang="fr-FR" sz="2200" dirty="0" smtClean="0"/>
           </a:p>
           <a:p>
             <a:pPr marL="0" indent="0">
               <a:buNone/>
             </a:pPr>
-            <a:endParaRPr lang="fr-FR" dirty="0"/>
+            <a:endParaRPr lang="fr-FR" sz="2200" dirty="0"/>
           </a:p>
           <a:p>
             <a:pPr marL="0" indent="0">
               <a:buNone/>
             </a:pPr>
-            <a:endParaRPr lang="fr-FR" dirty="0" smtClean="0"/>
+            <a:endParaRPr lang="fr-FR" sz="2200" dirty="0" smtClean="0"/>
           </a:p>
           <a:p>
             <a:pPr marL="514350" indent="-514350">
               <a:buAutoNum type="romanUcPeriod"/>
             </a:pPr>
-            <a:endParaRPr lang="fr-FR" dirty="0"/>
+            <a:endParaRPr lang="fr-FR" sz="2200" dirty="0"/>
           </a:p>
         </p:txBody>
       </p:sp>
@@ -13309,6 +13394,46 @@
           </a:p>
         </p:txBody>
       </p:sp>
+      <p:pic>
+        <p:nvPicPr>
+          <p:cNvPr id="4" name="Image 3"/>
+          <p:cNvPicPr>
+            <a:picLocks noChangeAspect="1"/>
+          </p:cNvPicPr>
+          <p:nvPr/>
+        </p:nvPicPr>
+        <p:blipFill>
+          <a:blip r:embed="rId3">
+            <a:extLst>
+              <a:ext uri="{28A0092B-C50C-407E-A947-70E740481C1C}">
+                <a14:useLocalDpi xmlns:a14="http://schemas.microsoft.com/office/drawing/2010/main" val="0"/>
+              </a:ext>
+            </a:extLst>
+          </a:blip>
+          <a:stretch>
+            <a:fillRect/>
+          </a:stretch>
+        </p:blipFill>
+        <p:spPr>
+          <a:xfrm>
+            <a:off x="6178356" y="1006472"/>
+            <a:ext cx="5450473" cy="3994949"/>
+          </a:xfrm>
+          <a:prstGeom prst="rect">
+            <a:avLst/>
+          </a:prstGeom>
+          <a:ln>
+            <a:noFill/>
+          </a:ln>
+          <a:effectLst>
+            <a:outerShdw blurRad="292100" dist="139700" dir="2700000" algn="tl" rotWithShape="0">
+              <a:srgbClr val="333333">
+                <a:alpha val="65000"/>
+              </a:srgbClr>
+            </a:outerShdw>
+          </a:effectLst>
+        </p:spPr>
+      </p:pic>
     </p:spTree>
     <p:extLst>
       <p:ext uri="{BB962C8B-B14F-4D97-AF65-F5344CB8AC3E}">

</xml_diff>